<commit_message>
control presentation and elettronic draw
</commit_message>
<xml_diff>
--- a/00_Relazione/Progettazione elettro-software/Elettronica e sensori.pptx
+++ b/00_Relazione/Progettazione elettro-software/Elettronica e sensori.pptx
@@ -5,10 +5,10 @@
     <p:sldMasterId id="2147483648" r:id="rId1"/>
   </p:sldMasterIdLst>
   <p:notesMasterIdLst>
-    <p:notesMasterId r:id="rId8"/>
+    <p:notesMasterId r:id="rId9"/>
   </p:notesMasterIdLst>
   <p:handoutMasterIdLst>
-    <p:handoutMasterId r:id="rId9"/>
+    <p:handoutMasterId r:id="rId10"/>
   </p:handoutMasterIdLst>
   <p:sldIdLst>
     <p:sldId id="256" r:id="rId2"/>
@@ -17,6 +17,7 @@
     <p:sldId id="289" r:id="rId5"/>
     <p:sldId id="290" r:id="rId6"/>
     <p:sldId id="291" r:id="rId7"/>
+    <p:sldId id="293" r:id="rId8"/>
   </p:sldIdLst>
   <p:sldSz cx="12188825" cy="6858000"/>
   <p:notesSz cx="6858000" cy="9144000"/>
@@ -8020,8 +8021,8 @@
           </a:p>
         </p:txBody>
       </p:sp>
-      <mc:AlternateContent xmlns:mc="http://schemas.openxmlformats.org/markup-compatibility/2006">
-        <mc:Choice xmlns:a14="http://schemas.microsoft.com/office/drawing/2010/main" Requires="a14">
+      <mc:AlternateContent xmlns:mc="http://schemas.openxmlformats.org/markup-compatibility/2006" xmlns:a14="http://schemas.microsoft.com/office/drawing/2010/main">
+        <mc:Choice Requires="a14">
           <p:sp>
             <p:nvSpPr>
               <p:cNvPr id="10" name="CasellaDiTesto 9">
@@ -8108,7 +8109,7 @@
             </p:txBody>
           </p:sp>
         </mc:Choice>
-        <mc:Fallback>
+        <mc:Fallback xmlns="">
           <p:sp>
             <p:nvSpPr>
               <p:cNvPr id="10" name="CasellaDiTesto 9">
@@ -8876,6 +8877,78 @@
     <p:extLst>
       <p:ext uri="{BB962C8B-B14F-4D97-AF65-F5344CB8AC3E}">
         <p14:creationId xmlns:p14="http://schemas.microsoft.com/office/powerpoint/2010/main" val="3016801823"/>
+      </p:ext>
+    </p:extLst>
+  </p:cSld>
+  <p:clrMapOvr>
+    <a:masterClrMapping/>
+  </p:clrMapOvr>
+  <mc:AlternateContent xmlns:mc="http://schemas.openxmlformats.org/markup-compatibility/2006" xmlns:p14="http://schemas.microsoft.com/office/powerpoint/2010/main">
+    <mc:Choice Requires="p14">
+      <p:transition spd="med" p14:dur="700">
+        <p:fade/>
+      </p:transition>
+    </mc:Choice>
+    <mc:Fallback xmlns="">
+      <p:transition spd="med">
+        <p:fade/>
+      </p:transition>
+    </mc:Fallback>
+  </mc:AlternateContent>
+</p:sld>
+</file>
+
+<file path=ppt/slides/slide7.xml><?xml version="1.0" encoding="utf-8"?>
+<p:sld xmlns:a="http://schemas.openxmlformats.org/drawingml/2006/main" xmlns:r="http://schemas.openxmlformats.org/officeDocument/2006/relationships" xmlns:p="http://schemas.openxmlformats.org/presentationml/2006/main">
+  <p:cSld>
+    <p:spTree>
+      <p:nvGrpSpPr>
+        <p:cNvPr id="1" name=""/>
+        <p:cNvGrpSpPr/>
+        <p:nvPr/>
+      </p:nvGrpSpPr>
+      <p:grpSpPr>
+        <a:xfrm>
+          <a:off x="0" y="0"/>
+          <a:ext cx="0" cy="0"/>
+          <a:chOff x="0" y="0"/>
+          <a:chExt cx="0" cy="0"/>
+        </a:xfrm>
+      </p:grpSpPr>
+      <p:pic>
+        <p:nvPicPr>
+          <p:cNvPr id="3" name="Immagine 2" descr="Immagine che contiene testo, mappa&#10;&#10;Descrizione generata automaticamente">
+            <a:extLst>
+              <a:ext uri="{FF2B5EF4-FFF2-40B4-BE49-F238E27FC236}">
+                <a16:creationId xmlns:a16="http://schemas.microsoft.com/office/drawing/2014/main" id="{0E27B55F-5570-4D50-839B-8DC89522290F}"/>
+              </a:ext>
+            </a:extLst>
+          </p:cNvPr>
+          <p:cNvPicPr>
+            <a:picLocks noChangeAspect="1"/>
+          </p:cNvPicPr>
+          <p:nvPr/>
+        </p:nvPicPr>
+        <p:blipFill>
+          <a:blip r:embed="rId2"/>
+          <a:stretch>
+            <a:fillRect/>
+          </a:stretch>
+        </p:blipFill>
+        <p:spPr>
+          <a:xfrm>
+            <a:off x="1295552" y="0"/>
+            <a:ext cx="9597721" cy="6858000"/>
+          </a:xfrm>
+          <a:prstGeom prst="rect">
+            <a:avLst/>
+          </a:prstGeom>
+        </p:spPr>
+      </p:pic>
+    </p:spTree>
+    <p:extLst>
+      <p:ext uri="{BB962C8B-B14F-4D97-AF65-F5344CB8AC3E}">
+        <p14:creationId xmlns:p14="http://schemas.microsoft.com/office/powerpoint/2010/main" val="605804883"/>
       </p:ext>
     </p:extLst>
   </p:cSld>

</xml_diff>